<commit_message>
landmarking and script update
</commit_message>
<xml_diff>
--- a/Data/Template_antechinus.pptx
+++ b/Data/Template_antechinus.pptx
@@ -244,7 +244,7 @@
           <a:p>
             <a:fld id="{6828E322-763D-4848-A343-3B7250C823DA}" type="datetimeFigureOut">
               <a:rPr lang="en-AU" smtClean="0"/>
-              <a:t>25/02/2020</a:t>
+              <a:t>18/05/2020</a:t>
             </a:fld>
             <a:endParaRPr lang="en-AU"/>
           </a:p>
@@ -414,7 +414,7 @@
           <a:p>
             <a:fld id="{6828E322-763D-4848-A343-3B7250C823DA}" type="datetimeFigureOut">
               <a:rPr lang="en-AU" smtClean="0"/>
-              <a:t>25/02/2020</a:t>
+              <a:t>18/05/2020</a:t>
             </a:fld>
             <a:endParaRPr lang="en-AU"/>
           </a:p>
@@ -594,7 +594,7 @@
           <a:p>
             <a:fld id="{6828E322-763D-4848-A343-3B7250C823DA}" type="datetimeFigureOut">
               <a:rPr lang="en-AU" smtClean="0"/>
-              <a:t>25/02/2020</a:t>
+              <a:t>18/05/2020</a:t>
             </a:fld>
             <a:endParaRPr lang="en-AU"/>
           </a:p>
@@ -764,7 +764,7 @@
           <a:p>
             <a:fld id="{6828E322-763D-4848-A343-3B7250C823DA}" type="datetimeFigureOut">
               <a:rPr lang="en-AU" smtClean="0"/>
-              <a:t>25/02/2020</a:t>
+              <a:t>18/05/2020</a:t>
             </a:fld>
             <a:endParaRPr lang="en-AU"/>
           </a:p>
@@ -1010,7 +1010,7 @@
           <a:p>
             <a:fld id="{6828E322-763D-4848-A343-3B7250C823DA}" type="datetimeFigureOut">
               <a:rPr lang="en-AU" smtClean="0"/>
-              <a:t>25/02/2020</a:t>
+              <a:t>18/05/2020</a:t>
             </a:fld>
             <a:endParaRPr lang="en-AU"/>
           </a:p>
@@ -1242,7 +1242,7 @@
           <a:p>
             <a:fld id="{6828E322-763D-4848-A343-3B7250C823DA}" type="datetimeFigureOut">
               <a:rPr lang="en-AU" smtClean="0"/>
-              <a:t>25/02/2020</a:t>
+              <a:t>18/05/2020</a:t>
             </a:fld>
             <a:endParaRPr lang="en-AU"/>
           </a:p>
@@ -1609,7 +1609,7 @@
           <a:p>
             <a:fld id="{6828E322-763D-4848-A343-3B7250C823DA}" type="datetimeFigureOut">
               <a:rPr lang="en-AU" smtClean="0"/>
-              <a:t>25/02/2020</a:t>
+              <a:t>18/05/2020</a:t>
             </a:fld>
             <a:endParaRPr lang="en-AU"/>
           </a:p>
@@ -1727,7 +1727,7 @@
           <a:p>
             <a:fld id="{6828E322-763D-4848-A343-3B7250C823DA}" type="datetimeFigureOut">
               <a:rPr lang="en-AU" smtClean="0"/>
-              <a:t>25/02/2020</a:t>
+              <a:t>18/05/2020</a:t>
             </a:fld>
             <a:endParaRPr lang="en-AU"/>
           </a:p>
@@ -1822,7 +1822,7 @@
           <a:p>
             <a:fld id="{6828E322-763D-4848-A343-3B7250C823DA}" type="datetimeFigureOut">
               <a:rPr lang="en-AU" smtClean="0"/>
-              <a:t>25/02/2020</a:t>
+              <a:t>18/05/2020</a:t>
             </a:fld>
             <a:endParaRPr lang="en-AU"/>
           </a:p>
@@ -2099,7 +2099,7 @@
           <a:p>
             <a:fld id="{6828E322-763D-4848-A343-3B7250C823DA}" type="datetimeFigureOut">
               <a:rPr lang="en-AU" smtClean="0"/>
-              <a:t>25/02/2020</a:t>
+              <a:t>18/05/2020</a:t>
             </a:fld>
             <a:endParaRPr lang="en-AU"/>
           </a:p>
@@ -2352,7 +2352,7 @@
           <a:p>
             <a:fld id="{6828E322-763D-4848-A343-3B7250C823DA}" type="datetimeFigureOut">
               <a:rPr lang="en-AU" smtClean="0"/>
-              <a:t>25/02/2020</a:t>
+              <a:t>18/05/2020</a:t>
             </a:fld>
             <a:endParaRPr lang="en-AU"/>
           </a:p>
@@ -2565,7 +2565,7 @@
           <a:p>
             <a:fld id="{6828E322-763D-4848-A343-3B7250C823DA}" type="datetimeFigureOut">
               <a:rPr lang="en-AU" smtClean="0"/>
-              <a:t>25/02/2020</a:t>
+              <a:t>18/05/2020</a:t>
             </a:fld>
             <a:endParaRPr lang="en-AU"/>
           </a:p>
@@ -4798,7 +4798,7 @@
           </p:nvSpPr>
           <p:spPr>
             <a:xfrm>
-              <a:off x="6459708" y="5725322"/>
+              <a:off x="6748990" y="6068375"/>
               <a:ext cx="181419" cy="161925"/>
             </a:xfrm>
             <a:prstGeom prst="ellipse">
@@ -4853,7 +4853,7 @@
           </p:nvSpPr>
           <p:spPr>
             <a:xfrm>
-              <a:off x="8669181" y="5720242"/>
+              <a:off x="8369086" y="6068375"/>
               <a:ext cx="181419" cy="161925"/>
             </a:xfrm>
             <a:prstGeom prst="ellipse">

</xml_diff>